<commit_message>
new files for stack
</commit_message>
<xml_diff>
--- a/misc/plainbi_stack.pptx
+++ b/misc/plainbi_stack.pptx
@@ -104,6 +104,11 @@
       </a:defRPr>
     </a:lvl9pPr>
   </p:defaultTextStyle>
+  <p:extLst>
+    <p:ext uri="{EFAFB233-063F-42B5-8137-9DF3F51BA10A}">
+      <p15:sldGuideLst xmlns:p15="http://schemas.microsoft.com/office/powerpoint/2012/main"/>
+    </p:ext>
+  </p:extLst>
 </p:presentation>
 </file>
 
@@ -120,12 +125,12 @@
   <pc:docChgLst>
     <pc:chgData name="KOLP, Markus" userId="ba04912f-a61b-497e-9556-670aab5126fd" providerId="ADAL" clId="{E9B8B17C-F662-49EA-BA62-ADC99E9EC187}"/>
     <pc:docChg chg="custSel modSld">
-      <pc:chgData name="KOLP, Markus" userId="ba04912f-a61b-497e-9556-670aab5126fd" providerId="ADAL" clId="{E9B8B17C-F662-49EA-BA62-ADC99E9EC187}" dt="2024-02-21T07:28:04.716" v="427" actId="1076"/>
+      <pc:chgData name="KOLP, Markus" userId="ba04912f-a61b-497e-9556-670aab5126fd" providerId="ADAL" clId="{E9B8B17C-F662-49EA-BA62-ADC99E9EC187}" dt="2024-02-21T09:53:10.399" v="436" actId="1076"/>
       <pc:docMkLst>
         <pc:docMk/>
       </pc:docMkLst>
       <pc:sldChg chg="addSp delSp modSp mod">
-        <pc:chgData name="KOLP, Markus" userId="ba04912f-a61b-497e-9556-670aab5126fd" providerId="ADAL" clId="{E9B8B17C-F662-49EA-BA62-ADC99E9EC187}" dt="2024-02-21T07:28:04.716" v="427" actId="1076"/>
+        <pc:chgData name="KOLP, Markus" userId="ba04912f-a61b-497e-9556-670aab5126fd" providerId="ADAL" clId="{E9B8B17C-F662-49EA-BA62-ADC99E9EC187}" dt="2024-02-21T09:53:10.399" v="436" actId="1076"/>
         <pc:sldMkLst>
           <pc:docMk/>
           <pc:sldMk cId="3990627373" sldId="256"/>
@@ -138,192 +143,208 @@
             <ac:spMk id="4" creationId="{2130F4D3-3287-1CCB-7D5F-B91843FC34D1}"/>
           </ac:spMkLst>
         </pc:spChg>
-        <pc:spChg chg="mod">
-          <ac:chgData name="KOLP, Markus" userId="ba04912f-a61b-497e-9556-670aab5126fd" providerId="ADAL" clId="{E9B8B17C-F662-49EA-BA62-ADC99E9EC187}" dt="2024-02-21T07:27:59.861" v="426" actId="1076"/>
+        <pc:spChg chg="mod topLvl">
+          <ac:chgData name="KOLP, Markus" userId="ba04912f-a61b-497e-9556-670aab5126fd" providerId="ADAL" clId="{E9B8B17C-F662-49EA-BA62-ADC99E9EC187}" dt="2024-02-21T09:53:02.731" v="432" actId="165"/>
           <ac:spMkLst>
             <pc:docMk/>
             <pc:sldMk cId="3990627373" sldId="256"/>
             <ac:spMk id="5" creationId="{0D8B5C26-8452-3E70-CD47-C542B1442E13}"/>
           </ac:spMkLst>
         </pc:spChg>
-        <pc:spChg chg="add mod">
-          <ac:chgData name="KOLP, Markus" userId="ba04912f-a61b-497e-9556-670aab5126fd" providerId="ADAL" clId="{E9B8B17C-F662-49EA-BA62-ADC99E9EC187}" dt="2024-02-21T07:27:59.861" v="426" actId="1076"/>
+        <pc:spChg chg="add mod topLvl">
+          <ac:chgData name="KOLP, Markus" userId="ba04912f-a61b-497e-9556-670aab5126fd" providerId="ADAL" clId="{E9B8B17C-F662-49EA-BA62-ADC99E9EC187}" dt="2024-02-21T09:53:02.731" v="432" actId="165"/>
           <ac:spMkLst>
             <pc:docMk/>
             <pc:sldMk cId="3990627373" sldId="256"/>
             <ac:spMk id="6" creationId="{0E07B52A-6639-C9D8-7BA1-09FC30264F8D}"/>
           </ac:spMkLst>
         </pc:spChg>
-        <pc:spChg chg="add mod ord">
-          <ac:chgData name="KOLP, Markus" userId="ba04912f-a61b-497e-9556-670aab5126fd" providerId="ADAL" clId="{E9B8B17C-F662-49EA-BA62-ADC99E9EC187}" dt="2024-02-21T07:27:59.861" v="426" actId="1076"/>
+        <pc:spChg chg="add mod ord topLvl">
+          <ac:chgData name="KOLP, Markus" userId="ba04912f-a61b-497e-9556-670aab5126fd" providerId="ADAL" clId="{E9B8B17C-F662-49EA-BA62-ADC99E9EC187}" dt="2024-02-21T09:53:02.731" v="432" actId="165"/>
           <ac:spMkLst>
             <pc:docMk/>
             <pc:sldMk cId="3990627373" sldId="256"/>
             <ac:spMk id="7" creationId="{82AA48BB-6854-BE1B-4D2A-96B067F5573E}"/>
           </ac:spMkLst>
         </pc:spChg>
-        <pc:spChg chg="add mod ord">
-          <ac:chgData name="KOLP, Markus" userId="ba04912f-a61b-497e-9556-670aab5126fd" providerId="ADAL" clId="{E9B8B17C-F662-49EA-BA62-ADC99E9EC187}" dt="2024-02-21T07:27:59.861" v="426" actId="1076"/>
+        <pc:spChg chg="add mod ord topLvl">
+          <ac:chgData name="KOLP, Markus" userId="ba04912f-a61b-497e-9556-670aab5126fd" providerId="ADAL" clId="{E9B8B17C-F662-49EA-BA62-ADC99E9EC187}" dt="2024-02-21T09:53:02.731" v="432" actId="165"/>
           <ac:spMkLst>
             <pc:docMk/>
             <pc:sldMk cId="3990627373" sldId="256"/>
             <ac:spMk id="8" creationId="{E9D05DDE-FD36-B4D6-EB97-3BB0B67494F1}"/>
           </ac:spMkLst>
         </pc:spChg>
-        <pc:spChg chg="add mod ord">
-          <ac:chgData name="KOLP, Markus" userId="ba04912f-a61b-497e-9556-670aab5126fd" providerId="ADAL" clId="{E9B8B17C-F662-49EA-BA62-ADC99E9EC187}" dt="2024-02-21T07:27:59.861" v="426" actId="1076"/>
+        <pc:spChg chg="add mod ord topLvl">
+          <ac:chgData name="KOLP, Markus" userId="ba04912f-a61b-497e-9556-670aab5126fd" providerId="ADAL" clId="{E9B8B17C-F662-49EA-BA62-ADC99E9EC187}" dt="2024-02-21T09:53:02.731" v="432" actId="165"/>
           <ac:spMkLst>
             <pc:docMk/>
             <pc:sldMk cId="3990627373" sldId="256"/>
             <ac:spMk id="9" creationId="{77172D8F-6E2C-2C97-2A70-B2048CB93519}"/>
           </ac:spMkLst>
         </pc:spChg>
-        <pc:spChg chg="add mod">
-          <ac:chgData name="KOLP, Markus" userId="ba04912f-a61b-497e-9556-670aab5126fd" providerId="ADAL" clId="{E9B8B17C-F662-49EA-BA62-ADC99E9EC187}" dt="2024-02-21T07:27:59.861" v="426" actId="1076"/>
+        <pc:spChg chg="add mod topLvl">
+          <ac:chgData name="KOLP, Markus" userId="ba04912f-a61b-497e-9556-670aab5126fd" providerId="ADAL" clId="{E9B8B17C-F662-49EA-BA62-ADC99E9EC187}" dt="2024-02-21T09:53:02.731" v="432" actId="165"/>
           <ac:spMkLst>
             <pc:docMk/>
             <pc:sldMk cId="3990627373" sldId="256"/>
             <ac:spMk id="10" creationId="{4E814190-D751-100E-E5FD-B193B067F276}"/>
           </ac:spMkLst>
         </pc:spChg>
-        <pc:spChg chg="add mod">
-          <ac:chgData name="KOLP, Markus" userId="ba04912f-a61b-497e-9556-670aab5126fd" providerId="ADAL" clId="{E9B8B17C-F662-49EA-BA62-ADC99E9EC187}" dt="2024-02-21T07:27:59.861" v="426" actId="1076"/>
+        <pc:spChg chg="add mod topLvl">
+          <ac:chgData name="KOLP, Markus" userId="ba04912f-a61b-497e-9556-670aab5126fd" providerId="ADAL" clId="{E9B8B17C-F662-49EA-BA62-ADC99E9EC187}" dt="2024-02-21T09:53:02.731" v="432" actId="165"/>
           <ac:spMkLst>
             <pc:docMk/>
             <pc:sldMk cId="3990627373" sldId="256"/>
             <ac:spMk id="11" creationId="{A30AAAC6-D49A-16D8-E16B-ABBD2A29CAA7}"/>
           </ac:spMkLst>
         </pc:spChg>
-        <pc:spChg chg="add mod">
-          <ac:chgData name="KOLP, Markus" userId="ba04912f-a61b-497e-9556-670aab5126fd" providerId="ADAL" clId="{E9B8B17C-F662-49EA-BA62-ADC99E9EC187}" dt="2024-02-21T07:27:59.861" v="426" actId="1076"/>
+        <pc:spChg chg="add mod topLvl">
+          <ac:chgData name="KOLP, Markus" userId="ba04912f-a61b-497e-9556-670aab5126fd" providerId="ADAL" clId="{E9B8B17C-F662-49EA-BA62-ADC99E9EC187}" dt="2024-02-21T09:53:02.731" v="432" actId="165"/>
           <ac:spMkLst>
             <pc:docMk/>
             <pc:sldMk cId="3990627373" sldId="256"/>
             <ac:spMk id="12" creationId="{B027FAE4-203D-7174-B908-9933B1CC9CD9}"/>
           </ac:spMkLst>
         </pc:spChg>
-        <pc:spChg chg="add mod">
-          <ac:chgData name="KOLP, Markus" userId="ba04912f-a61b-497e-9556-670aab5126fd" providerId="ADAL" clId="{E9B8B17C-F662-49EA-BA62-ADC99E9EC187}" dt="2024-02-21T07:27:59.861" v="426" actId="1076"/>
+        <pc:spChg chg="add mod topLvl">
+          <ac:chgData name="KOLP, Markus" userId="ba04912f-a61b-497e-9556-670aab5126fd" providerId="ADAL" clId="{E9B8B17C-F662-49EA-BA62-ADC99E9EC187}" dt="2024-02-21T09:53:02.731" v="432" actId="165"/>
           <ac:spMkLst>
             <pc:docMk/>
             <pc:sldMk cId="3990627373" sldId="256"/>
             <ac:spMk id="13" creationId="{B3562C42-48E5-D041-0B7D-86F67450C1EE}"/>
           </ac:spMkLst>
         </pc:spChg>
-        <pc:spChg chg="add mod">
-          <ac:chgData name="KOLP, Markus" userId="ba04912f-a61b-497e-9556-670aab5126fd" providerId="ADAL" clId="{E9B8B17C-F662-49EA-BA62-ADC99E9EC187}" dt="2024-02-21T07:27:59.861" v="426" actId="1076"/>
+        <pc:spChg chg="add mod topLvl">
+          <ac:chgData name="KOLP, Markus" userId="ba04912f-a61b-497e-9556-670aab5126fd" providerId="ADAL" clId="{E9B8B17C-F662-49EA-BA62-ADC99E9EC187}" dt="2024-02-21T09:53:02.731" v="432" actId="165"/>
           <ac:spMkLst>
             <pc:docMk/>
             <pc:sldMk cId="3990627373" sldId="256"/>
             <ac:spMk id="14" creationId="{CCEA8648-0461-AE5A-1262-7E5265257D45}"/>
           </ac:spMkLst>
         </pc:spChg>
-        <pc:spChg chg="add mod">
-          <ac:chgData name="KOLP, Markus" userId="ba04912f-a61b-497e-9556-670aab5126fd" providerId="ADAL" clId="{E9B8B17C-F662-49EA-BA62-ADC99E9EC187}" dt="2024-02-21T07:27:59.861" v="426" actId="1076"/>
+        <pc:spChg chg="add mod topLvl">
+          <ac:chgData name="KOLP, Markus" userId="ba04912f-a61b-497e-9556-670aab5126fd" providerId="ADAL" clId="{E9B8B17C-F662-49EA-BA62-ADC99E9EC187}" dt="2024-02-21T09:53:02.731" v="432" actId="165"/>
           <ac:spMkLst>
             <pc:docMk/>
             <pc:sldMk cId="3990627373" sldId="256"/>
             <ac:spMk id="15" creationId="{5C4BDEAA-A175-1486-793A-E8BEB52A70FD}"/>
           </ac:spMkLst>
         </pc:spChg>
-        <pc:spChg chg="add mod">
-          <ac:chgData name="KOLP, Markus" userId="ba04912f-a61b-497e-9556-670aab5126fd" providerId="ADAL" clId="{E9B8B17C-F662-49EA-BA62-ADC99E9EC187}" dt="2024-02-21T07:27:59.861" v="426" actId="1076"/>
+        <pc:spChg chg="add mod topLvl">
+          <ac:chgData name="KOLP, Markus" userId="ba04912f-a61b-497e-9556-670aab5126fd" providerId="ADAL" clId="{E9B8B17C-F662-49EA-BA62-ADC99E9EC187}" dt="2024-02-21T09:53:02.731" v="432" actId="165"/>
           <ac:spMkLst>
             <pc:docMk/>
             <pc:sldMk cId="3990627373" sldId="256"/>
             <ac:spMk id="17" creationId="{F42F7638-EAC5-0293-C787-88C0A43D81F9}"/>
           </ac:spMkLst>
         </pc:spChg>
-        <pc:spChg chg="add mod">
-          <ac:chgData name="KOLP, Markus" userId="ba04912f-a61b-497e-9556-670aab5126fd" providerId="ADAL" clId="{E9B8B17C-F662-49EA-BA62-ADC99E9EC187}" dt="2024-02-21T07:28:04.716" v="427" actId="1076"/>
+        <pc:spChg chg="add mod topLvl">
+          <ac:chgData name="KOLP, Markus" userId="ba04912f-a61b-497e-9556-670aab5126fd" providerId="ADAL" clId="{E9B8B17C-F662-49EA-BA62-ADC99E9EC187}" dt="2024-02-21T09:53:02.731" v="432" actId="165"/>
           <ac:spMkLst>
             <pc:docMk/>
             <pc:sldMk cId="3990627373" sldId="256"/>
             <ac:spMk id="18" creationId="{399DFA64-27A5-2E85-5D3C-8A81E5C251C8}"/>
           </ac:spMkLst>
         </pc:spChg>
-        <pc:picChg chg="mod">
-          <ac:chgData name="KOLP, Markus" userId="ba04912f-a61b-497e-9556-670aab5126fd" providerId="ADAL" clId="{E9B8B17C-F662-49EA-BA62-ADC99E9EC187}" dt="2024-02-21T07:27:59.861" v="426" actId="1076"/>
+        <pc:grpChg chg="add del mod">
+          <ac:chgData name="KOLP, Markus" userId="ba04912f-a61b-497e-9556-670aab5126fd" providerId="ADAL" clId="{E9B8B17C-F662-49EA-BA62-ADC99E9EC187}" dt="2024-02-21T09:53:02.731" v="432" actId="165"/>
+          <ac:grpSpMkLst>
+            <pc:docMk/>
+            <pc:sldMk cId="3990627373" sldId="256"/>
+            <ac:grpSpMk id="2" creationId="{245024A7-34DD-47C7-8E27-FF272EADC619}"/>
+          </ac:grpSpMkLst>
+        </pc:grpChg>
+        <pc:picChg chg="add mod">
+          <ac:chgData name="KOLP, Markus" userId="ba04912f-a61b-497e-9556-670aab5126fd" providerId="ADAL" clId="{E9B8B17C-F662-49EA-BA62-ADC99E9EC187}" dt="2024-02-21T09:53:10.399" v="436" actId="1076"/>
+          <ac:picMkLst>
+            <pc:docMk/>
+            <pc:sldMk cId="3990627373" sldId="256"/>
+            <ac:picMk id="3" creationId="{799FE98C-8724-2F62-FB58-734258222646}"/>
+          </ac:picMkLst>
+        </pc:picChg>
+        <pc:picChg chg="mod topLvl">
+          <ac:chgData name="KOLP, Markus" userId="ba04912f-a61b-497e-9556-670aab5126fd" providerId="ADAL" clId="{E9B8B17C-F662-49EA-BA62-ADC99E9EC187}" dt="2024-02-21T09:53:02.731" v="432" actId="165"/>
           <ac:picMkLst>
             <pc:docMk/>
             <pc:sldMk cId="3990627373" sldId="256"/>
             <ac:picMk id="1026" creationId="{E1983A5E-CF77-7B00-365B-36F82A0738F5}"/>
           </ac:picMkLst>
         </pc:picChg>
-        <pc:picChg chg="mod">
-          <ac:chgData name="KOLP, Markus" userId="ba04912f-a61b-497e-9556-670aab5126fd" providerId="ADAL" clId="{E9B8B17C-F662-49EA-BA62-ADC99E9EC187}" dt="2024-02-21T07:27:59.861" v="426" actId="1076"/>
+        <pc:picChg chg="mod topLvl">
+          <ac:chgData name="KOLP, Markus" userId="ba04912f-a61b-497e-9556-670aab5126fd" providerId="ADAL" clId="{E9B8B17C-F662-49EA-BA62-ADC99E9EC187}" dt="2024-02-21T09:53:02.731" v="432" actId="165"/>
           <ac:picMkLst>
             <pc:docMk/>
             <pc:sldMk cId="3990627373" sldId="256"/>
             <ac:picMk id="1028" creationId="{63F38162-4117-1BE4-FADE-C7B13E0AEF34}"/>
           </ac:picMkLst>
         </pc:picChg>
-        <pc:picChg chg="mod">
-          <ac:chgData name="KOLP, Markus" userId="ba04912f-a61b-497e-9556-670aab5126fd" providerId="ADAL" clId="{E9B8B17C-F662-49EA-BA62-ADC99E9EC187}" dt="2024-02-21T07:27:59.861" v="426" actId="1076"/>
+        <pc:picChg chg="mod topLvl">
+          <ac:chgData name="KOLP, Markus" userId="ba04912f-a61b-497e-9556-670aab5126fd" providerId="ADAL" clId="{E9B8B17C-F662-49EA-BA62-ADC99E9EC187}" dt="2024-02-21T09:53:02.731" v="432" actId="165"/>
           <ac:picMkLst>
             <pc:docMk/>
             <pc:sldMk cId="3990627373" sldId="256"/>
             <ac:picMk id="1030" creationId="{ECBAF037-3413-BAB1-1756-69C754BF7049}"/>
           </ac:picMkLst>
         </pc:picChg>
-        <pc:picChg chg="mod">
-          <ac:chgData name="KOLP, Markus" userId="ba04912f-a61b-497e-9556-670aab5126fd" providerId="ADAL" clId="{E9B8B17C-F662-49EA-BA62-ADC99E9EC187}" dt="2024-02-21T07:27:59.861" v="426" actId="1076"/>
+        <pc:picChg chg="mod topLvl">
+          <ac:chgData name="KOLP, Markus" userId="ba04912f-a61b-497e-9556-670aab5126fd" providerId="ADAL" clId="{E9B8B17C-F662-49EA-BA62-ADC99E9EC187}" dt="2024-02-21T09:53:02.731" v="432" actId="165"/>
           <ac:picMkLst>
             <pc:docMk/>
             <pc:sldMk cId="3990627373" sldId="256"/>
             <ac:picMk id="1032" creationId="{83DA360E-6BB7-E8FE-2F18-1E01EA6E4181}"/>
           </ac:picMkLst>
         </pc:picChg>
-        <pc:picChg chg="mod">
-          <ac:chgData name="KOLP, Markus" userId="ba04912f-a61b-497e-9556-670aab5126fd" providerId="ADAL" clId="{E9B8B17C-F662-49EA-BA62-ADC99E9EC187}" dt="2024-02-21T07:27:59.861" v="426" actId="1076"/>
+        <pc:picChg chg="mod topLvl">
+          <ac:chgData name="KOLP, Markus" userId="ba04912f-a61b-497e-9556-670aab5126fd" providerId="ADAL" clId="{E9B8B17C-F662-49EA-BA62-ADC99E9EC187}" dt="2024-02-21T09:53:02.731" v="432" actId="165"/>
           <ac:picMkLst>
             <pc:docMk/>
             <pc:sldMk cId="3990627373" sldId="256"/>
             <ac:picMk id="1034" creationId="{50138C36-C47C-300B-ED11-51BABADD3B50}"/>
           </ac:picMkLst>
         </pc:picChg>
-        <pc:picChg chg="mod">
-          <ac:chgData name="KOLP, Markus" userId="ba04912f-a61b-497e-9556-670aab5126fd" providerId="ADAL" clId="{E9B8B17C-F662-49EA-BA62-ADC99E9EC187}" dt="2024-02-21T07:27:59.861" v="426" actId="1076"/>
+        <pc:picChg chg="mod topLvl">
+          <ac:chgData name="KOLP, Markus" userId="ba04912f-a61b-497e-9556-670aab5126fd" providerId="ADAL" clId="{E9B8B17C-F662-49EA-BA62-ADC99E9EC187}" dt="2024-02-21T09:53:02.731" v="432" actId="165"/>
           <ac:picMkLst>
             <pc:docMk/>
             <pc:sldMk cId="3990627373" sldId="256"/>
             <ac:picMk id="1036" creationId="{F6B9BA06-A3F2-D5A1-9535-9B1F8791ADB1}"/>
           </ac:picMkLst>
         </pc:picChg>
-        <pc:picChg chg="mod">
-          <ac:chgData name="KOLP, Markus" userId="ba04912f-a61b-497e-9556-670aab5126fd" providerId="ADAL" clId="{E9B8B17C-F662-49EA-BA62-ADC99E9EC187}" dt="2024-02-21T07:27:59.861" v="426" actId="1076"/>
+        <pc:picChg chg="mod topLvl">
+          <ac:chgData name="KOLP, Markus" userId="ba04912f-a61b-497e-9556-670aab5126fd" providerId="ADAL" clId="{E9B8B17C-F662-49EA-BA62-ADC99E9EC187}" dt="2024-02-21T09:53:02.731" v="432" actId="165"/>
           <ac:picMkLst>
             <pc:docMk/>
             <pc:sldMk cId="3990627373" sldId="256"/>
             <ac:picMk id="1038" creationId="{39BB4455-5C89-49AC-B3C4-5D529A07CFF2}"/>
           </ac:picMkLst>
         </pc:picChg>
-        <pc:picChg chg="add mod">
-          <ac:chgData name="KOLP, Markus" userId="ba04912f-a61b-497e-9556-670aab5126fd" providerId="ADAL" clId="{E9B8B17C-F662-49EA-BA62-ADC99E9EC187}" dt="2024-02-21T07:27:59.861" v="426" actId="1076"/>
+        <pc:picChg chg="add mod topLvl">
+          <ac:chgData name="KOLP, Markus" userId="ba04912f-a61b-497e-9556-670aab5126fd" providerId="ADAL" clId="{E9B8B17C-F662-49EA-BA62-ADC99E9EC187}" dt="2024-02-21T09:53:05.335" v="433" actId="1076"/>
           <ac:picMkLst>
             <pc:docMk/>
             <pc:sldMk cId="3990627373" sldId="256"/>
             <ac:picMk id="1040" creationId="{A98FE536-89A8-8E56-4E29-988BC763863D}"/>
           </ac:picMkLst>
         </pc:picChg>
-        <pc:picChg chg="add mod">
-          <ac:chgData name="KOLP, Markus" userId="ba04912f-a61b-497e-9556-670aab5126fd" providerId="ADAL" clId="{E9B8B17C-F662-49EA-BA62-ADC99E9EC187}" dt="2024-02-21T07:27:59.861" v="426" actId="1076"/>
+        <pc:picChg chg="add mod topLvl">
+          <ac:chgData name="KOLP, Markus" userId="ba04912f-a61b-497e-9556-670aab5126fd" providerId="ADAL" clId="{E9B8B17C-F662-49EA-BA62-ADC99E9EC187}" dt="2024-02-21T09:53:06.616" v="434" actId="1076"/>
           <ac:picMkLst>
             <pc:docMk/>
             <pc:sldMk cId="3990627373" sldId="256"/>
             <ac:picMk id="1042" creationId="{EEC6EDA7-6FFC-69F8-218F-ADF72CC8F39B}"/>
           </ac:picMkLst>
         </pc:picChg>
-        <pc:picChg chg="add mod">
-          <ac:chgData name="KOLP, Markus" userId="ba04912f-a61b-497e-9556-670aab5126fd" providerId="ADAL" clId="{E9B8B17C-F662-49EA-BA62-ADC99E9EC187}" dt="2024-02-21T07:27:59.861" v="426" actId="1076"/>
+        <pc:picChg chg="add mod topLvl">
+          <ac:chgData name="KOLP, Markus" userId="ba04912f-a61b-497e-9556-670aab5126fd" providerId="ADAL" clId="{E9B8B17C-F662-49EA-BA62-ADC99E9EC187}" dt="2024-02-21T09:53:08.359" v="435" actId="1076"/>
           <ac:picMkLst>
             <pc:docMk/>
             <pc:sldMk cId="3990627373" sldId="256"/>
             <ac:picMk id="1044" creationId="{4D174CB9-2120-27FE-C0E8-CD6B97508907}"/>
           </ac:picMkLst>
         </pc:picChg>
-        <pc:picChg chg="add mod">
-          <ac:chgData name="KOLP, Markus" userId="ba04912f-a61b-497e-9556-670aab5126fd" providerId="ADAL" clId="{E9B8B17C-F662-49EA-BA62-ADC99E9EC187}" dt="2024-02-21T07:27:53.793" v="425" actId="1076"/>
+        <pc:picChg chg="add mod topLvl">
+          <ac:chgData name="KOLP, Markus" userId="ba04912f-a61b-497e-9556-670aab5126fd" providerId="ADAL" clId="{E9B8B17C-F662-49EA-BA62-ADC99E9EC187}" dt="2024-02-21T09:53:02.731" v="432" actId="165"/>
           <ac:picMkLst>
             <pc:docMk/>
             <pc:sldMk cId="3990627373" sldId="256"/>
@@ -4240,7 +4261,7 @@
         </p:blipFill>
         <p:spPr bwMode="auto">
           <a:xfrm>
-            <a:off x="1510162" y="1862278"/>
+            <a:off x="1510501" y="1746075"/>
             <a:ext cx="1689397" cy="619885"/>
           </a:xfrm>
           <a:prstGeom prst="rect">
@@ -4287,7 +4308,7 @@
         </p:blipFill>
         <p:spPr bwMode="auto">
           <a:xfrm>
-            <a:off x="1717351" y="2640444"/>
+            <a:off x="1717349" y="2399770"/>
             <a:ext cx="1275699" cy="604463"/>
           </a:xfrm>
           <a:prstGeom prst="rect">
@@ -4344,7 +4365,7 @@
         </p:blipFill>
         <p:spPr bwMode="auto">
           <a:xfrm>
-            <a:off x="1488162" y="3381072"/>
+            <a:off x="1497757" y="3017133"/>
             <a:ext cx="1827386" cy="836635"/>
           </a:xfrm>
           <a:prstGeom prst="rect">
@@ -4933,6 +4954,53 @@
           <a:xfrm>
             <a:off x="4642455" y="373967"/>
             <a:ext cx="2349997" cy="579178"/>
+          </a:xfrm>
+          <a:prstGeom prst="rect">
+            <a:avLst/>
+          </a:prstGeom>
+          <a:noFill/>
+          <a:extLst>
+            <a:ext uri="{909E8E84-426E-40DD-AFC4-6F175D3DCCD1}">
+              <a14:hiddenFill xmlns:a14="http://schemas.microsoft.com/office/drawing/2010/main">
+                <a:solidFill>
+                  <a:srgbClr val="FFFFFF"/>
+                </a:solidFill>
+              </a14:hiddenFill>
+            </a:ext>
+          </a:extLst>
+        </p:spPr>
+      </p:pic>
+      <p:pic>
+        <p:nvPicPr>
+          <p:cNvPr id="3" name="Picture 2">
+            <a:extLst>
+              <a:ext uri="{FF2B5EF4-FFF2-40B4-BE49-F238E27FC236}">
+                <a16:creationId xmlns:a16="http://schemas.microsoft.com/office/drawing/2014/main" id="{799FE98C-8724-2F62-FB58-734258222646}"/>
+              </a:ext>
+            </a:extLst>
+          </p:cNvPr>
+          <p:cNvPicPr>
+            <a:picLocks noChangeAspect="1" noChangeArrowheads="1"/>
+          </p:cNvPicPr>
+          <p:nvPr/>
+        </p:nvPicPr>
+        <p:blipFill>
+          <a:blip r:embed="rId13">
+            <a:extLst>
+              <a:ext uri="{28A0092B-C50C-407E-A947-70E740481C1C}">
+                <a14:useLocalDpi xmlns:a14="http://schemas.microsoft.com/office/drawing/2010/main" val="0"/>
+              </a:ext>
+            </a:extLst>
+          </a:blip>
+          <a:srcRect/>
+          <a:stretch>
+            <a:fillRect/>
+          </a:stretch>
+        </p:blipFill>
+        <p:spPr bwMode="auto">
+          <a:xfrm>
+            <a:off x="1630235" y="3897384"/>
+            <a:ext cx="1641899" cy="212934"/>
           </a:xfrm>
           <a:prstGeom prst="rect">
             <a:avLst/>

</xml_diff>